<commit_message>
updated sensor version display in script.js
</commit_message>
<xml_diff>
--- a/Documentation/airU Visualization.pptx
+++ b/Documentation/airU Visualization.pptx
@@ -8,6 +8,7 @@
     <p:sldId id="257" r:id="rId2"/>
     <p:sldId id="259" r:id="rId3"/>
     <p:sldId id="260" r:id="rId4"/>
+    <p:sldId id="261" r:id="rId5"/>
   </p:sldIdLst>
   <p:sldSz cx="12192000" cy="6858000"/>
   <p:notesSz cx="6858000" cy="9144000"/>
@@ -261,7 +262,7 @@
           <a:p>
             <a:fld id="{8ED84410-13EC-4211-AD91-0D7C7C8B3686}" type="datetimeFigureOut">
               <a:rPr lang="en-US" smtClean="0"/>
-              <a:t>4/30/2019</a:t>
+              <a:t>2/13/2020</a:t>
             </a:fld>
             <a:endParaRPr lang="en-US"/>
           </a:p>
@@ -459,7 +460,7 @@
           <a:p>
             <a:fld id="{8ED84410-13EC-4211-AD91-0D7C7C8B3686}" type="datetimeFigureOut">
               <a:rPr lang="en-US" smtClean="0"/>
-              <a:t>4/30/2019</a:t>
+              <a:t>2/13/2020</a:t>
             </a:fld>
             <a:endParaRPr lang="en-US"/>
           </a:p>
@@ -667,7 +668,7 @@
           <a:p>
             <a:fld id="{8ED84410-13EC-4211-AD91-0D7C7C8B3686}" type="datetimeFigureOut">
               <a:rPr lang="en-US" smtClean="0"/>
-              <a:t>4/30/2019</a:t>
+              <a:t>2/13/2020</a:t>
             </a:fld>
             <a:endParaRPr lang="en-US"/>
           </a:p>
@@ -865,7 +866,7 @@
           <a:p>
             <a:fld id="{8ED84410-13EC-4211-AD91-0D7C7C8B3686}" type="datetimeFigureOut">
               <a:rPr lang="en-US" smtClean="0"/>
-              <a:t>4/30/2019</a:t>
+              <a:t>2/13/2020</a:t>
             </a:fld>
             <a:endParaRPr lang="en-US"/>
           </a:p>
@@ -1140,7 +1141,7 @@
           <a:p>
             <a:fld id="{8ED84410-13EC-4211-AD91-0D7C7C8B3686}" type="datetimeFigureOut">
               <a:rPr lang="en-US" smtClean="0"/>
-              <a:t>4/30/2019</a:t>
+              <a:t>2/13/2020</a:t>
             </a:fld>
             <a:endParaRPr lang="en-US"/>
           </a:p>
@@ -1405,7 +1406,7 @@
           <a:p>
             <a:fld id="{8ED84410-13EC-4211-AD91-0D7C7C8B3686}" type="datetimeFigureOut">
               <a:rPr lang="en-US" smtClean="0"/>
-              <a:t>4/30/2019</a:t>
+              <a:t>2/13/2020</a:t>
             </a:fld>
             <a:endParaRPr lang="en-US"/>
           </a:p>
@@ -1817,7 +1818,7 @@
           <a:p>
             <a:fld id="{8ED84410-13EC-4211-AD91-0D7C7C8B3686}" type="datetimeFigureOut">
               <a:rPr lang="en-US" smtClean="0"/>
-              <a:t>4/30/2019</a:t>
+              <a:t>2/13/2020</a:t>
             </a:fld>
             <a:endParaRPr lang="en-US"/>
           </a:p>
@@ -1958,7 +1959,7 @@
           <a:p>
             <a:fld id="{8ED84410-13EC-4211-AD91-0D7C7C8B3686}" type="datetimeFigureOut">
               <a:rPr lang="en-US" smtClean="0"/>
-              <a:t>4/30/2019</a:t>
+              <a:t>2/13/2020</a:t>
             </a:fld>
             <a:endParaRPr lang="en-US"/>
           </a:p>
@@ -2071,7 +2072,7 @@
           <a:p>
             <a:fld id="{8ED84410-13EC-4211-AD91-0D7C7C8B3686}" type="datetimeFigureOut">
               <a:rPr lang="en-US" smtClean="0"/>
-              <a:t>4/30/2019</a:t>
+              <a:t>2/13/2020</a:t>
             </a:fld>
             <a:endParaRPr lang="en-US"/>
           </a:p>
@@ -2382,7 +2383,7 @@
           <a:p>
             <a:fld id="{8ED84410-13EC-4211-AD91-0D7C7C8B3686}" type="datetimeFigureOut">
               <a:rPr lang="en-US" smtClean="0"/>
-              <a:t>4/30/2019</a:t>
+              <a:t>2/13/2020</a:t>
             </a:fld>
             <a:endParaRPr lang="en-US"/>
           </a:p>
@@ -2670,7 +2671,7 @@
           <a:p>
             <a:fld id="{8ED84410-13EC-4211-AD91-0D7C7C8B3686}" type="datetimeFigureOut">
               <a:rPr lang="en-US" smtClean="0"/>
-              <a:t>4/30/2019</a:t>
+              <a:t>2/13/2020</a:t>
             </a:fld>
             <a:endParaRPr lang="en-US"/>
           </a:p>
@@ -2911,7 +2912,7 @@
           <a:p>
             <a:fld id="{8ED84410-13EC-4211-AD91-0D7C7C8B3686}" type="datetimeFigureOut">
               <a:rPr lang="en-US" smtClean="0"/>
-              <a:t>4/30/2019</a:t>
+              <a:t>2/13/2020</a:t>
             </a:fld>
             <a:endParaRPr lang="en-US"/>
           </a:p>
@@ -6561,6 +6562,1472 @@
 </p:sld>
 </file>
 
+<file path=ppt/slides/slide4.xml><?xml version="1.0" encoding="utf-8"?>
+<p:sld xmlns:a="http://schemas.openxmlformats.org/drawingml/2006/main" xmlns:r="http://schemas.openxmlformats.org/officeDocument/2006/relationships" xmlns:p="http://schemas.openxmlformats.org/presentationml/2006/main">
+  <p:cSld>
+    <p:spTree>
+      <p:nvGrpSpPr>
+        <p:cNvPr id="1" name=""/>
+        <p:cNvGrpSpPr/>
+        <p:nvPr/>
+      </p:nvGrpSpPr>
+      <p:grpSpPr>
+        <a:xfrm>
+          <a:off x="0" y="0"/>
+          <a:ext cx="0" cy="0"/>
+          <a:chOff x="0" y="0"/>
+          <a:chExt cx="0" cy="0"/>
+        </a:xfrm>
+      </p:grpSpPr>
+      <p:sp>
+        <p:nvSpPr>
+          <p:cNvPr id="2" name="TextBox 1">
+            <a:extLst>
+              <a:ext uri="{FF2B5EF4-FFF2-40B4-BE49-F238E27FC236}">
+                <a16:creationId xmlns:a16="http://schemas.microsoft.com/office/drawing/2014/main" id="{FF39E231-BECE-47BE-A092-854D5DB20F93}"/>
+              </a:ext>
+            </a:extLst>
+          </p:cNvPr>
+          <p:cNvSpPr txBox="1"/>
+          <p:nvPr/>
+        </p:nvSpPr>
+        <p:spPr>
+          <a:xfrm>
+            <a:off x="0" y="117806"/>
+            <a:ext cx="6096000" cy="523220"/>
+          </a:xfrm>
+          <a:prstGeom prst="rect">
+            <a:avLst/>
+          </a:prstGeom>
+          <a:noFill/>
+        </p:spPr>
+        <p:txBody>
+          <a:bodyPr wrap="square" rtlCol="0">
+            <a:spAutoFit/>
+          </a:bodyPr>
+          <a:lstStyle/>
+          <a:p>
+            <a:pPr algn="ctr"/>
+            <a:r>
+              <a:rPr lang="en-US" sz="2800" b="1" dirty="0" err="1"/>
+              <a:t>aqandu</a:t>
+            </a:r>
+            <a:endParaRPr lang="en-US" sz="2800" b="1" dirty="0"/>
+          </a:p>
+        </p:txBody>
+      </p:sp>
+      <p:sp>
+        <p:nvSpPr>
+          <p:cNvPr id="4" name="Rectangle 3">
+            <a:extLst>
+              <a:ext uri="{FF2B5EF4-FFF2-40B4-BE49-F238E27FC236}">
+                <a16:creationId xmlns:a16="http://schemas.microsoft.com/office/drawing/2014/main" id="{DCBC6E14-5B5D-4227-9515-0DCDBD7D0AC2}"/>
+              </a:ext>
+            </a:extLst>
+          </p:cNvPr>
+          <p:cNvSpPr/>
+          <p:nvPr/>
+        </p:nvSpPr>
+        <p:spPr>
+          <a:xfrm>
+            <a:off x="1100138" y="665951"/>
+            <a:ext cx="1878806" cy="4031003"/>
+          </a:xfrm>
+          <a:prstGeom prst="rect">
+            <a:avLst/>
+          </a:prstGeom>
+          <a:noFill/>
+        </p:spPr>
+        <p:style>
+          <a:lnRef idx="2">
+            <a:schemeClr val="accent1">
+              <a:shade val="50000"/>
+            </a:schemeClr>
+          </a:lnRef>
+          <a:fillRef idx="1">
+            <a:schemeClr val="accent1"/>
+          </a:fillRef>
+          <a:effectRef idx="0">
+            <a:schemeClr val="accent1"/>
+          </a:effectRef>
+          <a:fontRef idx="minor">
+            <a:schemeClr val="lt1"/>
+          </a:fontRef>
+        </p:style>
+        <p:txBody>
+          <a:bodyPr rtlCol="0" anchor="t" anchorCtr="0"/>
+          <a:lstStyle/>
+          <a:p>
+            <a:pPr algn="ctr"/>
+            <a:r>
+              <a:rPr lang="en-US" sz="2400" b="1" dirty="0">
+                <a:solidFill>
+                  <a:schemeClr val="tx1"/>
+                </a:solidFill>
+              </a:rPr>
+              <a:t>Current</a:t>
+            </a:r>
+          </a:p>
+        </p:txBody>
+      </p:sp>
+      <p:sp>
+        <p:nvSpPr>
+          <p:cNvPr id="5" name="Rectangle 4">
+            <a:extLst>
+              <a:ext uri="{FF2B5EF4-FFF2-40B4-BE49-F238E27FC236}">
+                <a16:creationId xmlns:a16="http://schemas.microsoft.com/office/drawing/2014/main" id="{DF85D4D7-147D-467E-8058-5957B462D650}"/>
+              </a:ext>
+            </a:extLst>
+          </p:cNvPr>
+          <p:cNvSpPr/>
+          <p:nvPr/>
+        </p:nvSpPr>
+        <p:spPr>
+          <a:xfrm>
+            <a:off x="1228727" y="1061790"/>
+            <a:ext cx="1621625" cy="1107281"/>
+          </a:xfrm>
+          <a:prstGeom prst="rect">
+            <a:avLst/>
+          </a:prstGeom>
+        </p:spPr>
+        <p:style>
+          <a:lnRef idx="2">
+            <a:schemeClr val="accent1">
+              <a:shade val="50000"/>
+            </a:schemeClr>
+          </a:lnRef>
+          <a:fillRef idx="1">
+            <a:schemeClr val="accent1"/>
+          </a:fillRef>
+          <a:effectRef idx="0">
+            <a:schemeClr val="accent1"/>
+          </a:effectRef>
+          <a:fontRef idx="minor">
+            <a:schemeClr val="lt1"/>
+          </a:fontRef>
+        </p:style>
+        <p:txBody>
+          <a:bodyPr rtlCol="0" anchor="ctr"/>
+          <a:lstStyle/>
+          <a:p>
+            <a:pPr algn="ctr"/>
+            <a:r>
+              <a:rPr lang="en-US" dirty="0"/>
+              <a:t>Web App</a:t>
+            </a:r>
+          </a:p>
+          <a:p>
+            <a:pPr algn="ctr"/>
+            <a:r>
+              <a:rPr lang="en-US" dirty="0"/>
+              <a:t>(GCP)</a:t>
+            </a:r>
+          </a:p>
+        </p:txBody>
+      </p:sp>
+      <p:sp>
+        <p:nvSpPr>
+          <p:cNvPr id="6" name="Rectangle 5">
+            <a:extLst>
+              <a:ext uri="{FF2B5EF4-FFF2-40B4-BE49-F238E27FC236}">
+                <a16:creationId xmlns:a16="http://schemas.microsoft.com/office/drawing/2014/main" id="{7ACBDB99-CF8B-435C-ADDE-E037AA3F801B}"/>
+              </a:ext>
+            </a:extLst>
+          </p:cNvPr>
+          <p:cNvSpPr/>
+          <p:nvPr/>
+        </p:nvSpPr>
+        <p:spPr>
+          <a:xfrm>
+            <a:off x="1228726" y="2258810"/>
+            <a:ext cx="1621626" cy="1107281"/>
+          </a:xfrm>
+          <a:prstGeom prst="rect">
+            <a:avLst/>
+          </a:prstGeom>
+        </p:spPr>
+        <p:style>
+          <a:lnRef idx="2">
+            <a:schemeClr val="accent1">
+              <a:shade val="50000"/>
+            </a:schemeClr>
+          </a:lnRef>
+          <a:fillRef idx="1">
+            <a:schemeClr val="accent1"/>
+          </a:fillRef>
+          <a:effectRef idx="0">
+            <a:schemeClr val="accent1"/>
+          </a:effectRef>
+          <a:fontRef idx="minor">
+            <a:schemeClr val="lt1"/>
+          </a:fontRef>
+        </p:style>
+        <p:txBody>
+          <a:bodyPr rtlCol="0" anchor="ctr"/>
+          <a:lstStyle/>
+          <a:p>
+            <a:pPr algn="ctr"/>
+            <a:r>
+              <a:rPr lang="en-US" dirty="0"/>
+              <a:t>Flask Server</a:t>
+            </a:r>
+          </a:p>
+          <a:p>
+            <a:pPr algn="ctr"/>
+            <a:r>
+              <a:rPr lang="en-US" dirty="0"/>
+              <a:t>(GCP)</a:t>
+            </a:r>
+          </a:p>
+        </p:txBody>
+      </p:sp>
+      <p:sp>
+        <p:nvSpPr>
+          <p:cNvPr id="7" name="Rectangle 6">
+            <a:extLst>
+              <a:ext uri="{FF2B5EF4-FFF2-40B4-BE49-F238E27FC236}">
+                <a16:creationId xmlns:a16="http://schemas.microsoft.com/office/drawing/2014/main" id="{4575D588-E9C7-4D46-8E1F-6C27FFDF750E}"/>
+              </a:ext>
+            </a:extLst>
+          </p:cNvPr>
+          <p:cNvSpPr/>
+          <p:nvPr/>
+        </p:nvSpPr>
+        <p:spPr>
+          <a:xfrm>
+            <a:off x="1239115" y="3445311"/>
+            <a:ext cx="1621625" cy="1107281"/>
+          </a:xfrm>
+          <a:prstGeom prst="rect">
+            <a:avLst/>
+          </a:prstGeom>
+        </p:spPr>
+        <p:style>
+          <a:lnRef idx="2">
+            <a:schemeClr val="accent1">
+              <a:shade val="50000"/>
+            </a:schemeClr>
+          </a:lnRef>
+          <a:fillRef idx="1">
+            <a:schemeClr val="accent1"/>
+          </a:fillRef>
+          <a:effectRef idx="0">
+            <a:schemeClr val="accent1"/>
+          </a:effectRef>
+          <a:fontRef idx="minor">
+            <a:schemeClr val="lt1"/>
+          </a:fontRef>
+        </p:style>
+        <p:txBody>
+          <a:bodyPr rtlCol="0" anchor="ctr"/>
+          <a:lstStyle/>
+          <a:p>
+            <a:pPr algn="ctr"/>
+            <a:r>
+              <a:rPr lang="en-US" dirty="0"/>
+              <a:t>Influx DB</a:t>
+            </a:r>
+          </a:p>
+          <a:p>
+            <a:pPr algn="ctr"/>
+            <a:r>
+              <a:rPr lang="en-US" dirty="0"/>
+              <a:t>(CADE)</a:t>
+            </a:r>
+          </a:p>
+        </p:txBody>
+      </p:sp>
+      <p:sp>
+        <p:nvSpPr>
+          <p:cNvPr id="8" name="Arrow: Up-Down 7">
+            <a:extLst>
+              <a:ext uri="{FF2B5EF4-FFF2-40B4-BE49-F238E27FC236}">
+                <a16:creationId xmlns:a16="http://schemas.microsoft.com/office/drawing/2014/main" id="{9D195B61-56DB-43B1-890D-D1CE1B7B4BA5}"/>
+              </a:ext>
+            </a:extLst>
+          </p:cNvPr>
+          <p:cNvSpPr/>
+          <p:nvPr/>
+        </p:nvSpPr>
+        <p:spPr>
+          <a:xfrm>
+            <a:off x="1859370" y="1890005"/>
+            <a:ext cx="381117" cy="580572"/>
+          </a:xfrm>
+          <a:prstGeom prst="upDownArrow">
+            <a:avLst/>
+          </a:prstGeom>
+          <a:solidFill>
+            <a:schemeClr val="accent4">
+              <a:lumMod val="60000"/>
+              <a:lumOff val="40000"/>
+            </a:schemeClr>
+          </a:solidFill>
+          <a:ln w="28575">
+            <a:solidFill>
+              <a:schemeClr val="tx1"/>
+            </a:solidFill>
+          </a:ln>
+        </p:spPr>
+        <p:style>
+          <a:lnRef idx="2">
+            <a:schemeClr val="accent1">
+              <a:shade val="50000"/>
+            </a:schemeClr>
+          </a:lnRef>
+          <a:fillRef idx="1">
+            <a:schemeClr val="accent1"/>
+          </a:fillRef>
+          <a:effectRef idx="0">
+            <a:schemeClr val="accent1"/>
+          </a:effectRef>
+          <a:fontRef idx="minor">
+            <a:schemeClr val="lt1"/>
+          </a:fontRef>
+        </p:style>
+        <p:txBody>
+          <a:bodyPr rtlCol="0" anchor="ctr"/>
+          <a:lstStyle/>
+          <a:p>
+            <a:pPr algn="ctr"/>
+            <a:endParaRPr lang="en-US"/>
+          </a:p>
+        </p:txBody>
+      </p:sp>
+      <p:sp>
+        <p:nvSpPr>
+          <p:cNvPr id="9" name="Arrow: Up-Down 8">
+            <a:extLst>
+              <a:ext uri="{FF2B5EF4-FFF2-40B4-BE49-F238E27FC236}">
+                <a16:creationId xmlns:a16="http://schemas.microsoft.com/office/drawing/2014/main" id="{E6C5D8B6-7616-48A9-87D3-13CB78439AFA}"/>
+              </a:ext>
+            </a:extLst>
+          </p:cNvPr>
+          <p:cNvSpPr/>
+          <p:nvPr/>
+        </p:nvSpPr>
+        <p:spPr>
+          <a:xfrm>
+            <a:off x="1877227" y="3103438"/>
+            <a:ext cx="381117" cy="580572"/>
+          </a:xfrm>
+          <a:prstGeom prst="upDownArrow">
+            <a:avLst/>
+          </a:prstGeom>
+          <a:solidFill>
+            <a:schemeClr val="accent4">
+              <a:lumMod val="60000"/>
+              <a:lumOff val="40000"/>
+            </a:schemeClr>
+          </a:solidFill>
+          <a:ln w="28575">
+            <a:solidFill>
+              <a:schemeClr val="tx1"/>
+            </a:solidFill>
+          </a:ln>
+        </p:spPr>
+        <p:style>
+          <a:lnRef idx="2">
+            <a:schemeClr val="accent1">
+              <a:shade val="50000"/>
+            </a:schemeClr>
+          </a:lnRef>
+          <a:fillRef idx="1">
+            <a:schemeClr val="accent1"/>
+          </a:fillRef>
+          <a:effectRef idx="0">
+            <a:schemeClr val="accent1"/>
+          </a:effectRef>
+          <a:fontRef idx="minor">
+            <a:schemeClr val="lt1"/>
+          </a:fontRef>
+        </p:style>
+        <p:txBody>
+          <a:bodyPr rtlCol="0" anchor="ctr"/>
+          <a:lstStyle/>
+          <a:p>
+            <a:pPr algn="ctr"/>
+            <a:endParaRPr lang="en-US"/>
+          </a:p>
+        </p:txBody>
+      </p:sp>
+      <p:sp>
+        <p:nvSpPr>
+          <p:cNvPr id="10" name="Rectangle 9">
+            <a:extLst>
+              <a:ext uri="{FF2B5EF4-FFF2-40B4-BE49-F238E27FC236}">
+                <a16:creationId xmlns:a16="http://schemas.microsoft.com/office/drawing/2014/main" id="{3F116CA2-F124-4D77-899D-C5C644E71F79}"/>
+              </a:ext>
+            </a:extLst>
+          </p:cNvPr>
+          <p:cNvSpPr/>
+          <p:nvPr/>
+        </p:nvSpPr>
+        <p:spPr>
+          <a:xfrm>
+            <a:off x="3107536" y="665951"/>
+            <a:ext cx="1878806" cy="4031003"/>
+          </a:xfrm>
+          <a:prstGeom prst="rect">
+            <a:avLst/>
+          </a:prstGeom>
+          <a:noFill/>
+        </p:spPr>
+        <p:style>
+          <a:lnRef idx="2">
+            <a:schemeClr val="accent1">
+              <a:shade val="50000"/>
+            </a:schemeClr>
+          </a:lnRef>
+          <a:fillRef idx="1">
+            <a:schemeClr val="accent1"/>
+          </a:fillRef>
+          <a:effectRef idx="0">
+            <a:schemeClr val="accent1"/>
+          </a:effectRef>
+          <a:fontRef idx="minor">
+            <a:schemeClr val="lt1"/>
+          </a:fontRef>
+        </p:style>
+        <p:txBody>
+          <a:bodyPr rtlCol="0" anchor="t" anchorCtr="0"/>
+          <a:lstStyle/>
+          <a:p>
+            <a:pPr algn="ctr"/>
+            <a:r>
+              <a:rPr lang="en-US" sz="2400" b="1" dirty="0">
+                <a:solidFill>
+                  <a:schemeClr val="tx1"/>
+                </a:solidFill>
+              </a:rPr>
+              <a:t>Future</a:t>
+            </a:r>
+          </a:p>
+          <a:p>
+            <a:pPr algn="ctr"/>
+            <a:r>
+              <a:rPr lang="en-US" sz="1600" b="1" dirty="0">
+                <a:solidFill>
+                  <a:schemeClr val="tx1"/>
+                </a:solidFill>
+              </a:rPr>
+              <a:t>(1xGCP project)</a:t>
+            </a:r>
+          </a:p>
+          <a:p>
+            <a:pPr algn="ctr"/>
+            <a:endParaRPr lang="en-US" sz="2400" b="1" dirty="0">
+              <a:solidFill>
+                <a:schemeClr val="tx1"/>
+              </a:solidFill>
+            </a:endParaRPr>
+          </a:p>
+        </p:txBody>
+      </p:sp>
+      <p:sp>
+        <p:nvSpPr>
+          <p:cNvPr id="11" name="Rectangle 10">
+            <a:extLst>
+              <a:ext uri="{FF2B5EF4-FFF2-40B4-BE49-F238E27FC236}">
+                <a16:creationId xmlns:a16="http://schemas.microsoft.com/office/drawing/2014/main" id="{0B78C13E-7993-4340-83BF-47EFA57E6BDE}"/>
+              </a:ext>
+            </a:extLst>
+          </p:cNvPr>
+          <p:cNvSpPr/>
+          <p:nvPr/>
+        </p:nvSpPr>
+        <p:spPr>
+          <a:xfrm>
+            <a:off x="3180765" y="1510099"/>
+            <a:ext cx="1621625" cy="1107281"/>
+          </a:xfrm>
+          <a:prstGeom prst="rect">
+            <a:avLst/>
+          </a:prstGeom>
+          <a:solidFill>
+            <a:schemeClr val="accent6">
+              <a:lumMod val="75000"/>
+            </a:schemeClr>
+          </a:solidFill>
+        </p:spPr>
+        <p:style>
+          <a:lnRef idx="2">
+            <a:schemeClr val="accent1">
+              <a:shade val="50000"/>
+            </a:schemeClr>
+          </a:lnRef>
+          <a:fillRef idx="1">
+            <a:schemeClr val="accent1"/>
+          </a:fillRef>
+          <a:effectRef idx="0">
+            <a:schemeClr val="accent1"/>
+          </a:effectRef>
+          <a:fontRef idx="minor">
+            <a:schemeClr val="lt1"/>
+          </a:fontRef>
+        </p:style>
+        <p:txBody>
+          <a:bodyPr rtlCol="0" anchor="ctr"/>
+          <a:lstStyle/>
+          <a:p>
+            <a:pPr algn="ctr"/>
+            <a:r>
+              <a:rPr lang="en-US" dirty="0"/>
+              <a:t>Web App</a:t>
+            </a:r>
+          </a:p>
+          <a:p>
+            <a:pPr algn="ctr"/>
+            <a:r>
+              <a:rPr lang="en-US" dirty="0"/>
+              <a:t>w/Flask Server</a:t>
+            </a:r>
+          </a:p>
+        </p:txBody>
+      </p:sp>
+      <p:sp>
+        <p:nvSpPr>
+          <p:cNvPr id="13" name="Rectangle 12">
+            <a:extLst>
+              <a:ext uri="{FF2B5EF4-FFF2-40B4-BE49-F238E27FC236}">
+                <a16:creationId xmlns:a16="http://schemas.microsoft.com/office/drawing/2014/main" id="{67A0D562-7936-474A-822C-BFDAFC7555C2}"/>
+              </a:ext>
+            </a:extLst>
+          </p:cNvPr>
+          <p:cNvSpPr/>
+          <p:nvPr/>
+        </p:nvSpPr>
+        <p:spPr>
+          <a:xfrm>
+            <a:off x="3236130" y="3461527"/>
+            <a:ext cx="1621625" cy="1107281"/>
+          </a:xfrm>
+          <a:prstGeom prst="rect">
+            <a:avLst/>
+          </a:prstGeom>
+          <a:solidFill>
+            <a:schemeClr val="accent6">
+              <a:lumMod val="75000"/>
+            </a:schemeClr>
+          </a:solidFill>
+        </p:spPr>
+        <p:style>
+          <a:lnRef idx="2">
+            <a:schemeClr val="accent1">
+              <a:shade val="50000"/>
+            </a:schemeClr>
+          </a:lnRef>
+          <a:fillRef idx="1">
+            <a:schemeClr val="accent1"/>
+          </a:fillRef>
+          <a:effectRef idx="0">
+            <a:schemeClr val="accent1"/>
+          </a:effectRef>
+          <a:fontRef idx="minor">
+            <a:schemeClr val="lt1"/>
+          </a:fontRef>
+        </p:style>
+        <p:txBody>
+          <a:bodyPr rtlCol="0" anchor="ctr"/>
+          <a:lstStyle/>
+          <a:p>
+            <a:pPr algn="ctr"/>
+            <a:r>
+              <a:rPr lang="en-US" dirty="0" err="1"/>
+              <a:t>BigQuery</a:t>
+            </a:r>
+            <a:r>
+              <a:rPr lang="en-US" dirty="0"/>
+              <a:t> DB</a:t>
+            </a:r>
+          </a:p>
+        </p:txBody>
+      </p:sp>
+      <p:sp>
+        <p:nvSpPr>
+          <p:cNvPr id="14" name="Arrow: Up-Down 13">
+            <a:extLst>
+              <a:ext uri="{FF2B5EF4-FFF2-40B4-BE49-F238E27FC236}">
+                <a16:creationId xmlns:a16="http://schemas.microsoft.com/office/drawing/2014/main" id="{345C65DD-8E91-4DA4-BD0A-06ECB6D04501}"/>
+              </a:ext>
+            </a:extLst>
+          </p:cNvPr>
+          <p:cNvSpPr/>
+          <p:nvPr/>
+        </p:nvSpPr>
+        <p:spPr>
+          <a:xfrm>
+            <a:off x="3856380" y="2389522"/>
+            <a:ext cx="381117" cy="1294487"/>
+          </a:xfrm>
+          <a:prstGeom prst="upDownArrow">
+            <a:avLst/>
+          </a:prstGeom>
+          <a:solidFill>
+            <a:schemeClr val="accent4">
+              <a:lumMod val="60000"/>
+              <a:lumOff val="40000"/>
+            </a:schemeClr>
+          </a:solidFill>
+          <a:ln w="28575">
+            <a:solidFill>
+              <a:schemeClr val="tx1"/>
+            </a:solidFill>
+          </a:ln>
+        </p:spPr>
+        <p:style>
+          <a:lnRef idx="2">
+            <a:schemeClr val="accent1">
+              <a:shade val="50000"/>
+            </a:schemeClr>
+          </a:lnRef>
+          <a:fillRef idx="1">
+            <a:schemeClr val="accent1"/>
+          </a:fillRef>
+          <a:effectRef idx="0">
+            <a:schemeClr val="accent1"/>
+          </a:effectRef>
+          <a:fontRef idx="minor">
+            <a:schemeClr val="lt1"/>
+          </a:fontRef>
+        </p:style>
+        <p:txBody>
+          <a:bodyPr rtlCol="0" anchor="ctr"/>
+          <a:lstStyle/>
+          <a:p>
+            <a:pPr algn="ctr"/>
+            <a:endParaRPr lang="en-US"/>
+          </a:p>
+        </p:txBody>
+      </p:sp>
+      <p:sp>
+        <p:nvSpPr>
+          <p:cNvPr id="16" name="TextBox 15">
+            <a:extLst>
+              <a:ext uri="{FF2B5EF4-FFF2-40B4-BE49-F238E27FC236}">
+                <a16:creationId xmlns:a16="http://schemas.microsoft.com/office/drawing/2014/main" id="{3DF46267-B902-48EA-9E5C-9F7E9A0D9F04}"/>
+              </a:ext>
+            </a:extLst>
+          </p:cNvPr>
+          <p:cNvSpPr txBox="1"/>
+          <p:nvPr/>
+        </p:nvSpPr>
+        <p:spPr>
+          <a:xfrm>
+            <a:off x="6095999" y="142731"/>
+            <a:ext cx="6096000" cy="523220"/>
+          </a:xfrm>
+          <a:prstGeom prst="rect">
+            <a:avLst/>
+          </a:prstGeom>
+          <a:noFill/>
+        </p:spPr>
+        <p:txBody>
+          <a:bodyPr wrap="square" rtlCol="0">
+            <a:spAutoFit/>
+          </a:bodyPr>
+          <a:lstStyle/>
+          <a:p>
+            <a:pPr algn="ctr"/>
+            <a:r>
+              <a:rPr lang="en-US" sz="2800" b="1" dirty="0"/>
+              <a:t>Cloud System</a:t>
+            </a:r>
+          </a:p>
+        </p:txBody>
+      </p:sp>
+      <p:sp>
+        <p:nvSpPr>
+          <p:cNvPr id="17" name="TextBox 16">
+            <a:extLst>
+              <a:ext uri="{FF2B5EF4-FFF2-40B4-BE49-F238E27FC236}">
+                <a16:creationId xmlns:a16="http://schemas.microsoft.com/office/drawing/2014/main" id="{F83DC59A-1DAB-40DA-A045-93F7E8390859}"/>
+              </a:ext>
+            </a:extLst>
+          </p:cNvPr>
+          <p:cNvSpPr txBox="1"/>
+          <p:nvPr/>
+        </p:nvSpPr>
+        <p:spPr>
+          <a:xfrm>
+            <a:off x="135732" y="4844481"/>
+            <a:ext cx="5960267" cy="1754326"/>
+          </a:xfrm>
+          <a:prstGeom prst="rect">
+            <a:avLst/>
+          </a:prstGeom>
+          <a:noFill/>
+        </p:spPr>
+        <p:txBody>
+          <a:bodyPr wrap="square" rtlCol="0">
+            <a:spAutoFit/>
+          </a:bodyPr>
+          <a:lstStyle/>
+          <a:p>
+            <a:r>
+              <a:rPr lang="en-US" b="1" dirty="0"/>
+              <a:t>Notes:</a:t>
+            </a:r>
+          </a:p>
+          <a:p>
+            <a:pPr marL="342900" indent="-342900">
+              <a:buAutoNum type="arabicPeriod"/>
+            </a:pPr>
+            <a:r>
+              <a:rPr lang="en-US" dirty="0"/>
+              <a:t>Create </a:t>
+            </a:r>
+            <a:r>
+              <a:rPr lang="en-US" dirty="0" err="1"/>
+              <a:t>BigQuery</a:t>
+            </a:r>
+            <a:r>
+              <a:rPr lang="en-US" dirty="0"/>
+              <a:t> instance in </a:t>
+            </a:r>
+            <a:r>
+              <a:rPr lang="en-US" dirty="0" err="1"/>
+              <a:t>aqandu</a:t>
+            </a:r>
+            <a:r>
+              <a:rPr lang="en-US" dirty="0"/>
+              <a:t> project</a:t>
+            </a:r>
+          </a:p>
+          <a:p>
+            <a:pPr marL="342900" indent="-342900">
+              <a:buAutoNum type="arabicPeriod"/>
+            </a:pPr>
+            <a:r>
+              <a:rPr lang="en-US" dirty="0"/>
+              <a:t>Web App pull data from </a:t>
+            </a:r>
+            <a:r>
+              <a:rPr lang="en-US" dirty="0" err="1"/>
+              <a:t>BigQuery</a:t>
+            </a:r>
+            <a:r>
+              <a:rPr lang="en-US" dirty="0"/>
+              <a:t> for visualization</a:t>
+            </a:r>
+          </a:p>
+          <a:p>
+            <a:pPr marL="342900" indent="-342900">
+              <a:buAutoNum type="arabicPeriod"/>
+            </a:pPr>
+            <a:r>
+              <a:rPr lang="en-US" dirty="0"/>
+              <a:t>Replicate Flask server API into the Web App</a:t>
+            </a:r>
+          </a:p>
+          <a:p>
+            <a:pPr marL="342900" indent="-342900">
+              <a:buAutoNum type="arabicPeriod"/>
+            </a:pPr>
+            <a:r>
+              <a:rPr lang="en-US" dirty="0"/>
+              <a:t>Login credentials WILL NOT be duplicated</a:t>
+            </a:r>
+          </a:p>
+          <a:p>
+            <a:pPr marL="342900" indent="-342900">
+              <a:buAutoNum type="arabicPeriod"/>
+            </a:pPr>
+            <a:endParaRPr lang="en-US" dirty="0"/>
+          </a:p>
+        </p:txBody>
+      </p:sp>
+      <p:sp>
+        <p:nvSpPr>
+          <p:cNvPr id="18" name="Rectangle 17">
+            <a:extLst>
+              <a:ext uri="{FF2B5EF4-FFF2-40B4-BE49-F238E27FC236}">
+                <a16:creationId xmlns:a16="http://schemas.microsoft.com/office/drawing/2014/main" id="{9D181C13-E117-4FF1-B79E-A18ADF3BAD72}"/>
+              </a:ext>
+            </a:extLst>
+          </p:cNvPr>
+          <p:cNvSpPr/>
+          <p:nvPr/>
+        </p:nvSpPr>
+        <p:spPr>
+          <a:xfrm>
+            <a:off x="7153272" y="665951"/>
+            <a:ext cx="3805232" cy="4031003"/>
+          </a:xfrm>
+          <a:prstGeom prst="rect">
+            <a:avLst/>
+          </a:prstGeom>
+          <a:noFill/>
+        </p:spPr>
+        <p:style>
+          <a:lnRef idx="2">
+            <a:schemeClr val="accent1">
+              <a:shade val="50000"/>
+            </a:schemeClr>
+          </a:lnRef>
+          <a:fillRef idx="1">
+            <a:schemeClr val="accent1"/>
+          </a:fillRef>
+          <a:effectRef idx="0">
+            <a:schemeClr val="accent1"/>
+          </a:effectRef>
+          <a:fontRef idx="minor">
+            <a:schemeClr val="lt1"/>
+          </a:fontRef>
+        </p:style>
+        <p:txBody>
+          <a:bodyPr rtlCol="0" anchor="t" anchorCtr="0"/>
+          <a:lstStyle/>
+          <a:p>
+            <a:pPr algn="ctr"/>
+            <a:endParaRPr lang="en-US" sz="2400" b="1" dirty="0">
+              <a:solidFill>
+                <a:schemeClr val="tx1"/>
+              </a:solidFill>
+            </a:endParaRPr>
+          </a:p>
+        </p:txBody>
+      </p:sp>
+      <p:sp>
+        <p:nvSpPr>
+          <p:cNvPr id="19" name="Rectangle 18">
+            <a:extLst>
+              <a:ext uri="{FF2B5EF4-FFF2-40B4-BE49-F238E27FC236}">
+                <a16:creationId xmlns:a16="http://schemas.microsoft.com/office/drawing/2014/main" id="{46C9DD5E-BB7F-4963-B7D0-9714C76DC9F3}"/>
+              </a:ext>
+            </a:extLst>
+          </p:cNvPr>
+          <p:cNvSpPr/>
+          <p:nvPr/>
+        </p:nvSpPr>
+        <p:spPr>
+          <a:xfrm>
+            <a:off x="7281866" y="1017922"/>
+            <a:ext cx="1621625" cy="1107281"/>
+          </a:xfrm>
+          <a:prstGeom prst="rect">
+            <a:avLst/>
+          </a:prstGeom>
+          <a:solidFill>
+            <a:schemeClr val="accent2">
+              <a:lumMod val="75000"/>
+            </a:schemeClr>
+          </a:solidFill>
+        </p:spPr>
+        <p:style>
+          <a:lnRef idx="2">
+            <a:schemeClr val="accent1">
+              <a:shade val="50000"/>
+            </a:schemeClr>
+          </a:lnRef>
+          <a:fillRef idx="1">
+            <a:schemeClr val="accent1"/>
+          </a:fillRef>
+          <a:effectRef idx="0">
+            <a:schemeClr val="accent1"/>
+          </a:effectRef>
+          <a:fontRef idx="minor">
+            <a:schemeClr val="lt1"/>
+          </a:fontRef>
+        </p:style>
+        <p:txBody>
+          <a:bodyPr rtlCol="0" anchor="ctr"/>
+          <a:lstStyle/>
+          <a:p>
+            <a:pPr algn="ctr"/>
+            <a:r>
+              <a:rPr lang="en-US" dirty="0"/>
+              <a:t>Web App</a:t>
+            </a:r>
+          </a:p>
+          <a:p>
+            <a:pPr algn="ctr"/>
+            <a:r>
+              <a:rPr lang="en-US" dirty="0"/>
+              <a:t>w/Flask Server</a:t>
+            </a:r>
+          </a:p>
+        </p:txBody>
+      </p:sp>
+      <p:sp>
+        <p:nvSpPr>
+          <p:cNvPr id="20" name="Rectangle 19">
+            <a:extLst>
+              <a:ext uri="{FF2B5EF4-FFF2-40B4-BE49-F238E27FC236}">
+                <a16:creationId xmlns:a16="http://schemas.microsoft.com/office/drawing/2014/main" id="{DB42E9CF-6FB5-4265-B6A0-CB6CBB8BC1FB}"/>
+              </a:ext>
+            </a:extLst>
+          </p:cNvPr>
+          <p:cNvSpPr/>
+          <p:nvPr/>
+        </p:nvSpPr>
+        <p:spPr>
+          <a:xfrm>
+            <a:off x="7281866" y="3197208"/>
+            <a:ext cx="1621625" cy="1107281"/>
+          </a:xfrm>
+          <a:prstGeom prst="rect">
+            <a:avLst/>
+          </a:prstGeom>
+          <a:solidFill>
+            <a:schemeClr val="accent2">
+              <a:lumMod val="75000"/>
+            </a:schemeClr>
+          </a:solidFill>
+        </p:spPr>
+        <p:style>
+          <a:lnRef idx="2">
+            <a:schemeClr val="accent1">
+              <a:shade val="50000"/>
+            </a:schemeClr>
+          </a:lnRef>
+          <a:fillRef idx="1">
+            <a:schemeClr val="accent1"/>
+          </a:fillRef>
+          <a:effectRef idx="0">
+            <a:schemeClr val="accent1"/>
+          </a:effectRef>
+          <a:fontRef idx="minor">
+            <a:schemeClr val="lt1"/>
+          </a:fontRef>
+        </p:style>
+        <p:txBody>
+          <a:bodyPr rtlCol="0" anchor="ctr"/>
+          <a:lstStyle/>
+          <a:p>
+            <a:pPr algn="ctr"/>
+            <a:r>
+              <a:rPr lang="en-US" dirty="0" err="1"/>
+              <a:t>BigQuery</a:t>
+            </a:r>
+            <a:r>
+              <a:rPr lang="en-US" dirty="0"/>
+              <a:t> DB</a:t>
+            </a:r>
+          </a:p>
+        </p:txBody>
+      </p:sp>
+      <p:sp>
+        <p:nvSpPr>
+          <p:cNvPr id="21" name="Arrow: Up-Down 20">
+            <a:extLst>
+              <a:ext uri="{FF2B5EF4-FFF2-40B4-BE49-F238E27FC236}">
+                <a16:creationId xmlns:a16="http://schemas.microsoft.com/office/drawing/2014/main" id="{FA970035-22DB-416B-A6E0-BBEBAAB9C37D}"/>
+              </a:ext>
+            </a:extLst>
+          </p:cNvPr>
+          <p:cNvSpPr/>
+          <p:nvPr/>
+        </p:nvSpPr>
+        <p:spPr>
+          <a:xfrm>
+            <a:off x="7902116" y="1884898"/>
+            <a:ext cx="381117" cy="1544102"/>
+          </a:xfrm>
+          <a:prstGeom prst="upDownArrow">
+            <a:avLst/>
+          </a:prstGeom>
+          <a:solidFill>
+            <a:schemeClr val="accent4">
+              <a:lumMod val="60000"/>
+              <a:lumOff val="40000"/>
+            </a:schemeClr>
+          </a:solidFill>
+          <a:ln w="28575">
+            <a:solidFill>
+              <a:schemeClr val="tx1"/>
+            </a:solidFill>
+          </a:ln>
+        </p:spPr>
+        <p:style>
+          <a:lnRef idx="2">
+            <a:schemeClr val="accent1">
+              <a:shade val="50000"/>
+            </a:schemeClr>
+          </a:lnRef>
+          <a:fillRef idx="1">
+            <a:schemeClr val="accent1"/>
+          </a:fillRef>
+          <a:effectRef idx="0">
+            <a:schemeClr val="accent1"/>
+          </a:effectRef>
+          <a:fontRef idx="minor">
+            <a:schemeClr val="lt1"/>
+          </a:fontRef>
+        </p:style>
+        <p:txBody>
+          <a:bodyPr rtlCol="0" anchor="ctr"/>
+          <a:lstStyle/>
+          <a:p>
+            <a:pPr algn="ctr"/>
+            <a:endParaRPr lang="en-US"/>
+          </a:p>
+        </p:txBody>
+      </p:sp>
+      <p:sp>
+        <p:nvSpPr>
+          <p:cNvPr id="22" name="Rectangle 21">
+            <a:extLst>
+              <a:ext uri="{FF2B5EF4-FFF2-40B4-BE49-F238E27FC236}">
+                <a16:creationId xmlns:a16="http://schemas.microsoft.com/office/drawing/2014/main" id="{66CE9372-EFF4-428B-9DE4-B944908D746F}"/>
+              </a:ext>
+            </a:extLst>
+          </p:cNvPr>
+          <p:cNvSpPr/>
+          <p:nvPr/>
+        </p:nvSpPr>
+        <p:spPr>
+          <a:xfrm>
+            <a:off x="9197578" y="1005559"/>
+            <a:ext cx="1621625" cy="1107281"/>
+          </a:xfrm>
+          <a:prstGeom prst="rect">
+            <a:avLst/>
+          </a:prstGeom>
+          <a:solidFill>
+            <a:schemeClr val="accent2">
+              <a:lumMod val="75000"/>
+            </a:schemeClr>
+          </a:solidFill>
+        </p:spPr>
+        <p:style>
+          <a:lnRef idx="2">
+            <a:schemeClr val="accent1">
+              <a:shade val="50000"/>
+            </a:schemeClr>
+          </a:lnRef>
+          <a:fillRef idx="1">
+            <a:schemeClr val="accent1"/>
+          </a:fillRef>
+          <a:effectRef idx="0">
+            <a:schemeClr val="accent1"/>
+          </a:effectRef>
+          <a:fontRef idx="minor">
+            <a:schemeClr val="lt1"/>
+          </a:fontRef>
+        </p:style>
+        <p:txBody>
+          <a:bodyPr rtlCol="0" anchor="ctr"/>
+          <a:lstStyle/>
+          <a:p>
+            <a:pPr algn="ctr"/>
+            <a:r>
+              <a:rPr lang="en-US" dirty="0"/>
+              <a:t>Mobile App</a:t>
+            </a:r>
+          </a:p>
+          <a:p>
+            <a:pPr algn="ctr"/>
+            <a:r>
+              <a:rPr lang="en-US" dirty="0"/>
+              <a:t>Wearable</a:t>
+            </a:r>
+          </a:p>
+        </p:txBody>
+      </p:sp>
+      <p:sp>
+        <p:nvSpPr>
+          <p:cNvPr id="24" name="TextBox 23">
+            <a:extLst>
+              <a:ext uri="{FF2B5EF4-FFF2-40B4-BE49-F238E27FC236}">
+                <a16:creationId xmlns:a16="http://schemas.microsoft.com/office/drawing/2014/main" id="{6791E45B-A448-4510-B1DB-C0B053D2CA39}"/>
+              </a:ext>
+            </a:extLst>
+          </p:cNvPr>
+          <p:cNvSpPr txBox="1"/>
+          <p:nvPr/>
+        </p:nvSpPr>
+        <p:spPr>
+          <a:xfrm>
+            <a:off x="6217445" y="4834644"/>
+            <a:ext cx="5960267" cy="2031325"/>
+          </a:xfrm>
+          <a:prstGeom prst="rect">
+            <a:avLst/>
+          </a:prstGeom>
+          <a:noFill/>
+        </p:spPr>
+        <p:txBody>
+          <a:bodyPr wrap="square" rtlCol="0">
+            <a:spAutoFit/>
+          </a:bodyPr>
+          <a:lstStyle/>
+          <a:p>
+            <a:r>
+              <a:rPr lang="en-US" b="1" dirty="0"/>
+              <a:t>Notes:</a:t>
+            </a:r>
+          </a:p>
+          <a:p>
+            <a:pPr marL="342900" indent="-342900">
+              <a:buAutoNum type="arabicPeriod"/>
+            </a:pPr>
+            <a:r>
+              <a:rPr lang="en-US" dirty="0"/>
+              <a:t>Maintain as is making incremental improvements in system as required</a:t>
+            </a:r>
+          </a:p>
+          <a:p>
+            <a:pPr marL="342900" indent="-342900">
+              <a:buAutoNum type="arabicPeriod"/>
+            </a:pPr>
+            <a:r>
+              <a:rPr lang="en-US" dirty="0"/>
+              <a:t>Continue work on API to support mobile app and wearable</a:t>
+            </a:r>
+          </a:p>
+          <a:p>
+            <a:endParaRPr lang="en-US" dirty="0"/>
+          </a:p>
+          <a:p>
+            <a:pPr marL="342900" indent="-342900">
+              <a:buAutoNum type="arabicPeriod"/>
+            </a:pPr>
+            <a:endParaRPr lang="en-US" dirty="0"/>
+          </a:p>
+        </p:txBody>
+      </p:sp>
+      <p:sp>
+        <p:nvSpPr>
+          <p:cNvPr id="25" name="Rectangle 24">
+            <a:extLst>
+              <a:ext uri="{FF2B5EF4-FFF2-40B4-BE49-F238E27FC236}">
+                <a16:creationId xmlns:a16="http://schemas.microsoft.com/office/drawing/2014/main" id="{D2DBCFCD-2222-4F6A-B47E-7B49C3BB2459}"/>
+              </a:ext>
+            </a:extLst>
+          </p:cNvPr>
+          <p:cNvSpPr/>
+          <p:nvPr/>
+        </p:nvSpPr>
+        <p:spPr>
+          <a:xfrm>
+            <a:off x="9120185" y="3184845"/>
+            <a:ext cx="1621625" cy="1107281"/>
+          </a:xfrm>
+          <a:prstGeom prst="rect">
+            <a:avLst/>
+          </a:prstGeom>
+          <a:solidFill>
+            <a:schemeClr val="accent2">
+              <a:lumMod val="75000"/>
+            </a:schemeClr>
+          </a:solidFill>
+        </p:spPr>
+        <p:style>
+          <a:lnRef idx="2">
+            <a:schemeClr val="accent1">
+              <a:shade val="50000"/>
+            </a:schemeClr>
+          </a:lnRef>
+          <a:fillRef idx="1">
+            <a:schemeClr val="accent1"/>
+          </a:fillRef>
+          <a:effectRef idx="0">
+            <a:schemeClr val="accent1"/>
+          </a:effectRef>
+          <a:fontRef idx="minor">
+            <a:schemeClr val="lt1"/>
+          </a:fontRef>
+        </p:style>
+        <p:txBody>
+          <a:bodyPr rtlCol="0" anchor="ctr"/>
+          <a:lstStyle/>
+          <a:p>
+            <a:pPr algn="ctr"/>
+            <a:r>
+              <a:rPr lang="en-US" dirty="0"/>
+              <a:t>Firebase </a:t>
+            </a:r>
+          </a:p>
+          <a:p>
+            <a:pPr algn="ctr"/>
+            <a:r>
+              <a:rPr lang="en-US" dirty="0"/>
+              <a:t>User Credentials</a:t>
+            </a:r>
+          </a:p>
+        </p:txBody>
+      </p:sp>
+      <p:cxnSp>
+        <p:nvCxnSpPr>
+          <p:cNvPr id="27" name="Straight Connector 26">
+            <a:extLst>
+              <a:ext uri="{FF2B5EF4-FFF2-40B4-BE49-F238E27FC236}">
+                <a16:creationId xmlns:a16="http://schemas.microsoft.com/office/drawing/2014/main" id="{20799E91-2303-4713-A925-286D1844E6C8}"/>
+              </a:ext>
+            </a:extLst>
+          </p:cNvPr>
+          <p:cNvCxnSpPr/>
+          <p:nvPr/>
+        </p:nvCxnSpPr>
+        <p:spPr>
+          <a:xfrm>
+            <a:off x="6095999" y="0"/>
+            <a:ext cx="0" cy="6858000"/>
+          </a:xfrm>
+          <a:prstGeom prst="line">
+            <a:avLst/>
+          </a:prstGeom>
+          <a:ln w="76200">
+            <a:solidFill>
+              <a:schemeClr val="tx1"/>
+            </a:solidFill>
+            <a:prstDash val="sysDot"/>
+          </a:ln>
+        </p:spPr>
+        <p:style>
+          <a:lnRef idx="1">
+            <a:schemeClr val="accent1"/>
+          </a:lnRef>
+          <a:fillRef idx="0">
+            <a:schemeClr val="accent1"/>
+          </a:fillRef>
+          <a:effectRef idx="0">
+            <a:schemeClr val="accent1"/>
+          </a:effectRef>
+          <a:fontRef idx="minor">
+            <a:schemeClr val="tx1"/>
+          </a:fontRef>
+        </p:style>
+      </p:cxnSp>
+      <p:sp>
+        <p:nvSpPr>
+          <p:cNvPr id="23" name="Arrow: Up-Down 22">
+            <a:extLst>
+              <a:ext uri="{FF2B5EF4-FFF2-40B4-BE49-F238E27FC236}">
+                <a16:creationId xmlns:a16="http://schemas.microsoft.com/office/drawing/2014/main" id="{1AC94F7B-02BE-42E0-AA8A-1ABCAECAB950}"/>
+              </a:ext>
+            </a:extLst>
+          </p:cNvPr>
+          <p:cNvSpPr/>
+          <p:nvPr/>
+        </p:nvSpPr>
+        <p:spPr>
+          <a:xfrm>
+            <a:off x="9740438" y="1884898"/>
+            <a:ext cx="381117" cy="1544101"/>
+          </a:xfrm>
+          <a:prstGeom prst="upDownArrow">
+            <a:avLst/>
+          </a:prstGeom>
+          <a:solidFill>
+            <a:schemeClr val="accent4">
+              <a:lumMod val="60000"/>
+              <a:lumOff val="40000"/>
+            </a:schemeClr>
+          </a:solidFill>
+          <a:ln w="28575">
+            <a:solidFill>
+              <a:schemeClr val="tx1"/>
+            </a:solidFill>
+          </a:ln>
+        </p:spPr>
+        <p:style>
+          <a:lnRef idx="2">
+            <a:schemeClr val="accent1">
+              <a:shade val="50000"/>
+            </a:schemeClr>
+          </a:lnRef>
+          <a:fillRef idx="1">
+            <a:schemeClr val="accent1"/>
+          </a:fillRef>
+          <a:effectRef idx="0">
+            <a:schemeClr val="accent1"/>
+          </a:effectRef>
+          <a:fontRef idx="minor">
+            <a:schemeClr val="lt1"/>
+          </a:fontRef>
+        </p:style>
+        <p:txBody>
+          <a:bodyPr rtlCol="0" anchor="ctr"/>
+          <a:lstStyle/>
+          <a:p>
+            <a:pPr algn="ctr"/>
+            <a:endParaRPr lang="en-US"/>
+          </a:p>
+        </p:txBody>
+      </p:sp>
+      <p:sp>
+        <p:nvSpPr>
+          <p:cNvPr id="30" name="Rectangle 29">
+            <a:extLst>
+              <a:ext uri="{FF2B5EF4-FFF2-40B4-BE49-F238E27FC236}">
+                <a16:creationId xmlns:a16="http://schemas.microsoft.com/office/drawing/2014/main" id="{B71F648B-8E37-4D3A-A496-9592A418F828}"/>
+              </a:ext>
+            </a:extLst>
+          </p:cNvPr>
+          <p:cNvSpPr/>
+          <p:nvPr/>
+        </p:nvSpPr>
+        <p:spPr>
+          <a:xfrm>
+            <a:off x="8103397" y="2459357"/>
+            <a:ext cx="1802603" cy="240981"/>
+          </a:xfrm>
+          <a:prstGeom prst="rect">
+            <a:avLst/>
+          </a:prstGeom>
+          <a:solidFill>
+            <a:schemeClr val="accent4">
+              <a:lumMod val="60000"/>
+              <a:lumOff val="40000"/>
+            </a:schemeClr>
+          </a:solidFill>
+          <a:ln w="28575">
+            <a:solidFill>
+              <a:schemeClr val="tx1"/>
+            </a:solidFill>
+          </a:ln>
+        </p:spPr>
+        <p:style>
+          <a:lnRef idx="2">
+            <a:schemeClr val="accent1">
+              <a:shade val="50000"/>
+            </a:schemeClr>
+          </a:lnRef>
+          <a:fillRef idx="1">
+            <a:schemeClr val="accent1"/>
+          </a:fillRef>
+          <a:effectRef idx="0">
+            <a:schemeClr val="accent1"/>
+          </a:effectRef>
+          <a:fontRef idx="minor">
+            <a:schemeClr val="lt1"/>
+          </a:fontRef>
+        </p:style>
+        <p:txBody>
+          <a:bodyPr rtlCol="0" anchor="ctr"/>
+          <a:lstStyle/>
+          <a:p>
+            <a:pPr algn="ctr"/>
+            <a:endParaRPr lang="en-US"/>
+          </a:p>
+        </p:txBody>
+      </p:sp>
+      <p:sp>
+        <p:nvSpPr>
+          <p:cNvPr id="31" name="Rectangle 30">
+            <a:extLst>
+              <a:ext uri="{FF2B5EF4-FFF2-40B4-BE49-F238E27FC236}">
+                <a16:creationId xmlns:a16="http://schemas.microsoft.com/office/drawing/2014/main" id="{02E58CB4-D20C-4AC6-A9B5-145C500D7F1D}"/>
+              </a:ext>
+            </a:extLst>
+          </p:cNvPr>
+          <p:cNvSpPr/>
+          <p:nvPr/>
+        </p:nvSpPr>
+        <p:spPr>
+          <a:xfrm>
+            <a:off x="9852025" y="2405719"/>
+            <a:ext cx="136525" cy="333023"/>
+          </a:xfrm>
+          <a:prstGeom prst="rect">
+            <a:avLst/>
+          </a:prstGeom>
+          <a:solidFill>
+            <a:schemeClr val="accent4">
+              <a:lumMod val="60000"/>
+              <a:lumOff val="40000"/>
+            </a:schemeClr>
+          </a:solidFill>
+          <a:ln>
+            <a:noFill/>
+          </a:ln>
+        </p:spPr>
+        <p:style>
+          <a:lnRef idx="2">
+            <a:schemeClr val="accent1">
+              <a:shade val="50000"/>
+            </a:schemeClr>
+          </a:lnRef>
+          <a:fillRef idx="1">
+            <a:schemeClr val="accent1"/>
+          </a:fillRef>
+          <a:effectRef idx="0">
+            <a:schemeClr val="accent1"/>
+          </a:effectRef>
+          <a:fontRef idx="minor">
+            <a:schemeClr val="lt1"/>
+          </a:fontRef>
+        </p:style>
+        <p:txBody>
+          <a:bodyPr rtlCol="0" anchor="ctr"/>
+          <a:lstStyle/>
+          <a:p>
+            <a:pPr algn="ctr"/>
+            <a:endParaRPr lang="en-US"/>
+          </a:p>
+        </p:txBody>
+      </p:sp>
+      <p:sp>
+        <p:nvSpPr>
+          <p:cNvPr id="32" name="Rectangle 31">
+            <a:extLst>
+              <a:ext uri="{FF2B5EF4-FFF2-40B4-BE49-F238E27FC236}">
+                <a16:creationId xmlns:a16="http://schemas.microsoft.com/office/drawing/2014/main" id="{814B2862-162C-4302-AC6C-64BDBE23624A}"/>
+              </a:ext>
+            </a:extLst>
+          </p:cNvPr>
+          <p:cNvSpPr/>
+          <p:nvPr/>
+        </p:nvSpPr>
+        <p:spPr>
+          <a:xfrm>
+            <a:off x="8039897" y="2389522"/>
+            <a:ext cx="136525" cy="333023"/>
+          </a:xfrm>
+          <a:prstGeom prst="rect">
+            <a:avLst/>
+          </a:prstGeom>
+          <a:solidFill>
+            <a:schemeClr val="accent4">
+              <a:lumMod val="60000"/>
+              <a:lumOff val="40000"/>
+            </a:schemeClr>
+          </a:solidFill>
+          <a:ln>
+            <a:noFill/>
+          </a:ln>
+        </p:spPr>
+        <p:style>
+          <a:lnRef idx="2">
+            <a:schemeClr val="accent1">
+              <a:shade val="50000"/>
+            </a:schemeClr>
+          </a:lnRef>
+          <a:fillRef idx="1">
+            <a:schemeClr val="accent1"/>
+          </a:fillRef>
+          <a:effectRef idx="0">
+            <a:schemeClr val="accent1"/>
+          </a:effectRef>
+          <a:fontRef idx="minor">
+            <a:schemeClr val="lt1"/>
+          </a:fontRef>
+        </p:style>
+        <p:txBody>
+          <a:bodyPr rtlCol="0" anchor="ctr"/>
+          <a:lstStyle/>
+          <a:p>
+            <a:pPr algn="ctr"/>
+            <a:endParaRPr lang="en-US"/>
+          </a:p>
+        </p:txBody>
+      </p:sp>
+    </p:spTree>
+    <p:extLst>
+      <p:ext uri="{BB962C8B-B14F-4D97-AF65-F5344CB8AC3E}">
+        <p14:creationId xmlns:p14="http://schemas.microsoft.com/office/powerpoint/2010/main" val="1397908983"/>
+      </p:ext>
+    </p:extLst>
+  </p:cSld>
+  <p:clrMapOvr>
+    <a:masterClrMapping/>
+  </p:clrMapOvr>
+</p:sld>
+</file>
+
 <file path=ppt/theme/theme1.xml><?xml version="1.0" encoding="utf-8"?>
 <a:theme xmlns:a="http://schemas.openxmlformats.org/drawingml/2006/main" name="Office Theme">
   <a:themeElements>

</xml_diff>